<commit_message>
Update SuggestionAdd activity diagram
 to use merge node instead of action node
</commit_message>
<xml_diff>
--- a/docs/diagrams/SuggestionAddActivityDiagram.pptx
+++ b/docs/diagrams/SuggestionAddActivityDiagram.pptx
@@ -3521,9 +3521,9 @@
           <p:nvPr/>
         </p:nvCxnSpPr>
         <p:spPr>
-          <a:xfrm>
-            <a:off x="5913176" y="-20052406"/>
-            <a:ext cx="2" cy="733883"/>
+          <a:xfrm flipH="1">
+            <a:off x="5909991" y="-20052406"/>
+            <a:ext cx="3185" cy="310728"/>
           </a:xfrm>
           <a:prstGeom prst="straightConnector1">
             <a:avLst/>
@@ -3561,10 +3561,10 @@
         </p:nvSpPr>
         <p:spPr>
           <a:xfrm>
-            <a:off x="4819668" y="-19318523"/>
-            <a:ext cx="2187019" cy="716437"/>
-          </a:xfrm>
-          <a:prstGeom prst="roundRect">
+            <a:off x="4252930" y="-19741678"/>
+            <a:ext cx="3314122" cy="1414760"/>
+          </a:xfrm>
+          <a:prstGeom prst="diamond">
             <a:avLst/>
           </a:prstGeom>
         </p:spPr>
@@ -3782,9 +3782,9 @@
           <p:nvPr/>
         </p:nvCxnSpPr>
         <p:spPr>
-          <a:xfrm flipH="1">
-            <a:off x="5913176" y="-18602086"/>
-            <a:ext cx="2" cy="791519"/>
+          <a:xfrm>
+            <a:off x="5909991" y="-18326918"/>
+            <a:ext cx="3185" cy="516351"/>
           </a:xfrm>
           <a:prstGeom prst="straightConnector1">
             <a:avLst/>
@@ -3957,7 +3957,7 @@
         </p:nvSpPr>
         <p:spPr>
           <a:xfrm>
-            <a:off x="7006687" y="-19339945"/>
+            <a:off x="7406991" y="-19399492"/>
             <a:ext cx="1972764" cy="369460"/>
           </a:xfrm>
           <a:prstGeom prst="rect">
@@ -4318,7 +4318,7 @@
         <p:spPr>
           <a:xfrm>
             <a:off x="5913175" y="-16732910"/>
-            <a:ext cx="3" cy="698876"/>
+            <a:ext cx="3" cy="350737"/>
           </a:xfrm>
           <a:prstGeom prst="straightConnector1">
             <a:avLst/>
@@ -4356,7 +4356,7 @@
         </p:nvSpPr>
         <p:spPr>
           <a:xfrm>
-            <a:off x="5913175" y="-18577796"/>
+            <a:off x="5869466" y="-18369924"/>
             <a:ext cx="1972764" cy="369460"/>
           </a:xfrm>
           <a:prstGeom prst="rect">
@@ -4465,10 +4465,10 @@
         </p:nvSpPr>
         <p:spPr>
           <a:xfrm>
-            <a:off x="4819668" y="-16034034"/>
-            <a:ext cx="2187019" cy="716437"/>
-          </a:xfrm>
-          <a:prstGeom prst="roundRect">
+            <a:off x="4377137" y="-16382173"/>
+            <a:ext cx="3072082" cy="1412716"/>
+          </a:xfrm>
+          <a:prstGeom prst="diamond">
             <a:avLst/>
           </a:prstGeom>
         </p:spPr>
@@ -4522,8 +4522,8 @@
         </p:nvCxnSpPr>
         <p:spPr>
           <a:xfrm flipH="1">
-            <a:off x="5913176" y="-15317597"/>
-            <a:ext cx="2" cy="791519"/>
+            <a:off x="5913176" y="-14969457"/>
+            <a:ext cx="2" cy="443379"/>
           </a:xfrm>
           <a:prstGeom prst="straightConnector1">
             <a:avLst/>
@@ -4561,7 +4561,7 @@
         </p:nvSpPr>
         <p:spPr>
           <a:xfrm>
-            <a:off x="7006687" y="-16055456"/>
+            <a:off x="7230860" y="-16056889"/>
             <a:ext cx="1972764" cy="369460"/>
           </a:xfrm>
           <a:prstGeom prst="rect">
@@ -4739,7 +4739,7 @@
         <p:spPr>
           <a:xfrm>
             <a:off x="5913175" y="-13448421"/>
-            <a:ext cx="3" cy="737240"/>
+            <a:ext cx="3" cy="429541"/>
           </a:xfrm>
           <a:prstGeom prst="straightConnector1">
             <a:avLst/>
@@ -4777,7 +4777,7 @@
         </p:nvSpPr>
         <p:spPr>
           <a:xfrm>
-            <a:off x="5913175" y="-15293307"/>
+            <a:off x="5865137" y="-15027379"/>
             <a:ext cx="1972764" cy="369460"/>
           </a:xfrm>
           <a:prstGeom prst="rect">
@@ -4883,8 +4883,8 @@
         </p:nvCxnSpPr>
         <p:spPr>
           <a:xfrm>
-            <a:off x="7006687" y="-18960304"/>
-            <a:ext cx="3196220" cy="24715298"/>
+            <a:off x="7567052" y="-19034298"/>
+            <a:ext cx="2635855" cy="24789292"/>
           </a:xfrm>
           <a:prstGeom prst="bentConnector2">
             <a:avLst/>
@@ -4919,8 +4919,8 @@
         </p:nvCxnSpPr>
         <p:spPr>
           <a:xfrm>
-            <a:off x="7006687" y="-15675815"/>
-            <a:ext cx="3196220" cy="21430809"/>
+            <a:off x="7449219" y="-15675815"/>
+            <a:ext cx="2753688" cy="21430809"/>
           </a:xfrm>
           <a:prstGeom prst="bentConnector2">
             <a:avLst/>
@@ -4958,10 +4958,10 @@
         </p:nvSpPr>
         <p:spPr>
           <a:xfrm>
-            <a:off x="4819668" y="-12711181"/>
-            <a:ext cx="2187019" cy="716437"/>
-          </a:xfrm>
-          <a:prstGeom prst="roundRect">
+            <a:off x="4440930" y="-13018880"/>
+            <a:ext cx="2944496" cy="1331836"/>
+          </a:xfrm>
+          <a:prstGeom prst="diamond">
             <a:avLst/>
           </a:prstGeom>
         </p:spPr>
@@ -5015,8 +5015,8 @@
         </p:nvCxnSpPr>
         <p:spPr>
           <a:xfrm flipH="1">
-            <a:off x="5913176" y="-11994744"/>
-            <a:ext cx="2" cy="791519"/>
+            <a:off x="5913176" y="-11687044"/>
+            <a:ext cx="2" cy="483819"/>
           </a:xfrm>
           <a:prstGeom prst="straightConnector1">
             <a:avLst/>
@@ -5135,7 +5135,7 @@
         <p:spPr>
           <a:xfrm>
             <a:off x="5913175" y="-10125568"/>
-            <a:ext cx="1" cy="730881"/>
+            <a:ext cx="1" cy="349977"/>
           </a:xfrm>
           <a:prstGeom prst="straightConnector1">
             <a:avLst/>
@@ -5246,10 +5246,10 @@
         </p:nvSpPr>
         <p:spPr>
           <a:xfrm>
-            <a:off x="4819666" y="-9394687"/>
-            <a:ext cx="2187019" cy="716437"/>
-          </a:xfrm>
-          <a:prstGeom prst="roundRect">
+            <a:off x="4440931" y="-9775591"/>
+            <a:ext cx="2944490" cy="1478246"/>
+          </a:xfrm>
+          <a:prstGeom prst="diamond">
             <a:avLst/>
           </a:prstGeom>
         </p:spPr>
@@ -5303,8 +5303,8 @@
         </p:nvCxnSpPr>
         <p:spPr>
           <a:xfrm flipH="1">
-            <a:off x="5913174" y="-8678250"/>
-            <a:ext cx="2" cy="791519"/>
+            <a:off x="5913174" y="-8297345"/>
+            <a:ext cx="2" cy="410614"/>
           </a:xfrm>
           <a:prstGeom prst="straightConnector1">
             <a:avLst/>
@@ -5385,7 +5385,7 @@
         <p:spPr>
           <a:xfrm>
             <a:off x="5913173" y="-6809074"/>
-            <a:ext cx="5" cy="745297"/>
+            <a:ext cx="5" cy="486981"/>
           </a:xfrm>
           <a:prstGeom prst="straightConnector1">
             <a:avLst/>
@@ -5563,12 +5563,12 @@
         <p:spPr>
           <a:xfrm flipH="1">
             <a:off x="5913176" y="-12352962"/>
-            <a:ext cx="1093511" cy="2958275"/>
+            <a:ext cx="1472250" cy="2577371"/>
           </a:xfrm>
           <a:prstGeom prst="bentConnector4">
             <a:avLst>
-              <a:gd name="adj1" fmla="val -254294"/>
-              <a:gd name="adj2" fmla="val 80044"/>
+              <a:gd name="adj1" fmla="val -166283"/>
+              <a:gd name="adj2" fmla="val 93882"/>
             </a:avLst>
           </a:prstGeom>
           <a:ln>
@@ -5604,7 +5604,7 @@
         </p:nvSpPr>
         <p:spPr>
           <a:xfrm>
-            <a:off x="5913172" y="-12002225"/>
+            <a:off x="5878936" y="-11704804"/>
             <a:ext cx="2725859" cy="369460"/>
           </a:xfrm>
           <a:prstGeom prst="rect">
@@ -5640,7 +5640,7 @@
         </p:nvSpPr>
         <p:spPr>
           <a:xfrm>
-            <a:off x="7006682" y="-12737523"/>
+            <a:off x="7064725" y="-12778383"/>
             <a:ext cx="2928887" cy="369460"/>
           </a:xfrm>
           <a:prstGeom prst="rect">
@@ -5676,7 +5676,7 @@
         </p:nvSpPr>
         <p:spPr>
           <a:xfrm>
-            <a:off x="5913171" y="-8689492"/>
+            <a:off x="5886822" y="-8372161"/>
             <a:ext cx="2725859" cy="369460"/>
           </a:xfrm>
           <a:prstGeom prst="rect">
@@ -5860,12 +5860,12 @@
         <p:spPr>
           <a:xfrm flipH="1">
             <a:off x="5913178" y="-9036468"/>
-            <a:ext cx="1093507" cy="2972691"/>
+            <a:ext cx="1472243" cy="2714375"/>
           </a:xfrm>
           <a:prstGeom prst="bentConnector4">
             <a:avLst>
-              <a:gd name="adj1" fmla="val -200627"/>
-              <a:gd name="adj2" fmla="val 79439"/>
+              <a:gd name="adj1" fmla="val -131841"/>
+              <a:gd name="adj2" fmla="val 86890"/>
             </a:avLst>
           </a:prstGeom>
           <a:ln>
@@ -5901,10 +5901,10 @@
         </p:nvSpPr>
         <p:spPr>
           <a:xfrm>
-            <a:off x="4819668" y="-6063777"/>
-            <a:ext cx="2187019" cy="716437"/>
-          </a:xfrm>
-          <a:prstGeom prst="roundRect">
+            <a:off x="4451809" y="-6322093"/>
+            <a:ext cx="2922738" cy="1233070"/>
+          </a:xfrm>
+          <a:prstGeom prst="diamond">
             <a:avLst/>
           </a:prstGeom>
         </p:spPr>
@@ -5958,8 +5958,8 @@
         </p:nvCxnSpPr>
         <p:spPr>
           <a:xfrm flipH="1">
-            <a:off x="5913176" y="-5347340"/>
-            <a:ext cx="2" cy="791519"/>
+            <a:off x="5913176" y="-5089023"/>
+            <a:ext cx="2" cy="533202"/>
           </a:xfrm>
           <a:prstGeom prst="straightConnector1">
             <a:avLst/>
@@ -5997,7 +5997,7 @@
         </p:nvSpPr>
         <p:spPr>
           <a:xfrm>
-            <a:off x="7006686" y="-6085199"/>
+            <a:off x="7106182" y="-6084225"/>
             <a:ext cx="2884589" cy="369460"/>
           </a:xfrm>
           <a:prstGeom prst="rect">
@@ -6109,7 +6109,7 @@
         </p:nvSpPr>
         <p:spPr>
           <a:xfrm>
-            <a:off x="5913175" y="-5323050"/>
+            <a:off x="5917370" y="-5026076"/>
             <a:ext cx="2480198" cy="369460"/>
           </a:xfrm>
           <a:prstGeom prst="rect">
@@ -6218,7 +6218,7 @@
         </p:nvSpPr>
         <p:spPr>
           <a:xfrm>
-            <a:off x="7006681" y="-9420345"/>
+            <a:off x="7140352" y="-9429259"/>
             <a:ext cx="2928887" cy="369460"/>
           </a:xfrm>
           <a:prstGeom prst="rect">
@@ -6259,7 +6259,7 @@
         <p:spPr>
           <a:xfrm>
             <a:off x="5913175" y="-3478164"/>
-            <a:ext cx="3" cy="756932"/>
+            <a:ext cx="3" cy="430300"/>
           </a:xfrm>
           <a:prstGeom prst="straightConnector1">
             <a:avLst/>
@@ -6372,12 +6372,12 @@
         <p:spPr>
           <a:xfrm flipH="1">
             <a:off x="5913178" y="-5705558"/>
-            <a:ext cx="1093509" cy="2984326"/>
+            <a:ext cx="1461369" cy="2657694"/>
           </a:xfrm>
           <a:prstGeom prst="bentConnector4">
             <a:avLst>
-              <a:gd name="adj1" fmla="val -234325"/>
-              <a:gd name="adj2" fmla="val 78868"/>
+              <a:gd name="adj1" fmla="val -156144"/>
+              <a:gd name="adj2" fmla="val 91626"/>
             </a:avLst>
           </a:prstGeom>
           <a:ln>
@@ -6466,10 +6466,10 @@
         </p:nvSpPr>
         <p:spPr>
           <a:xfrm>
-            <a:off x="4819668" y="-2721232"/>
-            <a:ext cx="2187019" cy="716437"/>
-          </a:xfrm>
-          <a:prstGeom prst="roundRect">
+            <a:off x="4423325" y="-3047864"/>
+            <a:ext cx="2979706" cy="1369702"/>
+          </a:xfrm>
+          <a:prstGeom prst="diamond">
             <a:avLst/>
           </a:prstGeom>
         </p:spPr>
@@ -6523,8 +6523,8 @@
         </p:nvCxnSpPr>
         <p:spPr>
           <a:xfrm flipH="1">
-            <a:off x="5913176" y="-2004795"/>
-            <a:ext cx="2" cy="791519"/>
+            <a:off x="5913176" y="-1678162"/>
+            <a:ext cx="2" cy="464886"/>
           </a:xfrm>
           <a:prstGeom prst="straightConnector1">
             <a:avLst/>
@@ -6562,7 +6562,7 @@
         </p:nvSpPr>
         <p:spPr>
           <a:xfrm>
-            <a:off x="7006687" y="-2742654"/>
+            <a:off x="7213620" y="-2764795"/>
             <a:ext cx="1972764" cy="369460"/>
           </a:xfrm>
           <a:prstGeom prst="rect">
@@ -6732,7 +6732,7 @@
         <p:spPr>
           <a:xfrm>
             <a:off x="5913175" y="-135619"/>
-            <a:ext cx="1" cy="667751"/>
+            <a:ext cx="1" cy="382509"/>
           </a:xfrm>
           <a:prstGeom prst="straightConnector1">
             <a:avLst/>
@@ -6770,7 +6770,7 @@
         </p:nvSpPr>
         <p:spPr>
           <a:xfrm>
-            <a:off x="5913175" y="-1980505"/>
+            <a:off x="5913173" y="-1689404"/>
             <a:ext cx="1972764" cy="369460"/>
           </a:xfrm>
           <a:prstGeom prst="rect">
@@ -6876,8 +6876,8 @@
         </p:nvCxnSpPr>
         <p:spPr>
           <a:xfrm>
-            <a:off x="7006687" y="-2363013"/>
-            <a:ext cx="3196220" cy="8118007"/>
+            <a:off x="7403031" y="-2363013"/>
+            <a:ext cx="2799876" cy="8118007"/>
           </a:xfrm>
           <a:prstGeom prst="bentConnector2">
             <a:avLst/>
@@ -6915,10 +6915,10 @@
         </p:nvSpPr>
         <p:spPr>
           <a:xfrm>
-            <a:off x="4819666" y="532132"/>
-            <a:ext cx="2187019" cy="716437"/>
-          </a:xfrm>
-          <a:prstGeom prst="roundRect">
+            <a:off x="4440930" y="246890"/>
+            <a:ext cx="2944492" cy="1286922"/>
+          </a:xfrm>
+          <a:prstGeom prst="diamond">
             <a:avLst/>
           </a:prstGeom>
         </p:spPr>
@@ -6972,8 +6972,8 @@
         </p:nvCxnSpPr>
         <p:spPr>
           <a:xfrm flipH="1">
-            <a:off x="5913174" y="1248569"/>
-            <a:ext cx="2" cy="791519"/>
+            <a:off x="5913174" y="1533812"/>
+            <a:ext cx="2" cy="506276"/>
           </a:xfrm>
           <a:prstGeom prst="straightConnector1">
             <a:avLst/>
@@ -7011,7 +7011,7 @@
         </p:nvSpPr>
         <p:spPr>
           <a:xfrm>
-            <a:off x="7006685" y="510710"/>
+            <a:off x="7210525" y="520891"/>
             <a:ext cx="1972764" cy="369460"/>
           </a:xfrm>
           <a:prstGeom prst="rect">
@@ -7138,7 +7138,7 @@
         </p:nvSpPr>
         <p:spPr>
           <a:xfrm>
-            <a:off x="5913173" y="1272859"/>
+            <a:off x="5901440" y="1513832"/>
             <a:ext cx="1972764" cy="369460"/>
           </a:xfrm>
           <a:prstGeom prst="rect">
@@ -7208,8 +7208,8 @@
         </p:nvCxnSpPr>
         <p:spPr>
           <a:xfrm>
-            <a:off x="7006685" y="890351"/>
-            <a:ext cx="3196222" cy="4864643"/>
+            <a:off x="7385422" y="890351"/>
+            <a:ext cx="2817485" cy="4864643"/>
           </a:xfrm>
           <a:prstGeom prst="bentConnector2">
             <a:avLst/>

</xml_diff>